<commit_message>
adicionei o documento das perguntas
</commit_message>
<xml_diff>
--- a/apresentacao/contextualizacao.pptx
+++ b/apresentacao/contextualizacao.pptx
@@ -5843,7 +5843,7 @@
         <p:spPr>
           <a:xfrm>
             <a:off x="4559610" y="1694378"/>
-            <a:ext cx="7055141" cy="5232202"/>
+            <a:ext cx="7055141" cy="3416320"/>
           </a:xfrm>
           <a:prstGeom prst="rect">
             <a:avLst/>
@@ -5883,72 +5883,10 @@
             </a:r>
           </a:p>
           <a:p>
-            <a:pPr marL="285750" indent="-285750">
-              <a:buFont typeface="Arial" panose="020B0604020202020204" pitchFamily="34" charset="0"/>
-              <a:buChar char="•"/>
-            </a:pPr>
-            <a:endParaRPr lang="pt-BR" dirty="0"/>
-          </a:p>
-          <a:p>
             <a:r>
               <a:rPr lang="pt-BR" dirty="0"/>
               <a:t>	</a:t>
             </a:r>
-            <a:r>
-              <a:rPr lang="pt-BR" sz="2800" dirty="0"/>
-              <a:t> </a:t>
-            </a:r>
-            <a:r>
-              <a:rPr lang="pt-BR" sz="2800" dirty="0">
-                <a:latin typeface="+mj-lt"/>
-              </a:rPr>
-              <a:t>Economia</a:t>
-            </a:r>
-            <a:r>
-              <a:rPr lang="pt-BR" sz="2800" dirty="0"/>
-              <a:t> </a:t>
-            </a:r>
-          </a:p>
-          <a:p>
-            <a:pPr marL="285750" indent="-285750">
-              <a:buFont typeface="Arial" panose="020B0604020202020204" pitchFamily="34" charset="0"/>
-              <a:buChar char="•"/>
-            </a:pPr>
-            <a:endParaRPr lang="pt-BR" dirty="0"/>
-          </a:p>
-          <a:p>
-            <a:pPr marL="285750" indent="-285750">
-              <a:buFont typeface="Arial" panose="020B0604020202020204" pitchFamily="34" charset="0"/>
-              <a:buChar char="•"/>
-            </a:pPr>
-            <a:r>
-              <a:rPr lang="pt-BR" dirty="0"/>
-              <a:t>Excesso de gasto com energia elétrica  </a:t>
-            </a:r>
-          </a:p>
-          <a:p>
-            <a:pPr marL="285750" indent="-285750">
-              <a:buFont typeface="Arial" panose="020B0604020202020204" pitchFamily="34" charset="0"/>
-              <a:buChar char="•"/>
-            </a:pPr>
-            <a:endParaRPr lang="pt-BR" dirty="0"/>
-          </a:p>
-          <a:p>
-            <a:pPr marL="285750" indent="-285750">
-              <a:buFont typeface="Arial" panose="020B0604020202020204" pitchFamily="34" charset="0"/>
-              <a:buChar char="•"/>
-            </a:pPr>
-            <a:r>
-              <a:rPr lang="pt-BR" dirty="0"/>
-              <a:t>Excesso de gasto com mão de obra</a:t>
-            </a:r>
-          </a:p>
-          <a:p>
-            <a:pPr marL="285750" indent="-285750">
-              <a:buFont typeface="Arial" panose="020B0604020202020204" pitchFamily="34" charset="0"/>
-              <a:buChar char="•"/>
-            </a:pPr>
-            <a:endParaRPr lang="pt-BR" dirty="0"/>
           </a:p>
           <a:p>
             <a:pPr marL="285750" indent="-285750">

</xml_diff>

<commit_message>
add o diagrana e alterei o ppt
</commit_message>
<xml_diff>
--- a/apresentacao/contextualizacao.pptx
+++ b/apresentacao/contextualizacao.pptx
@@ -211,7 +211,7 @@
             <a:pPr rtl="0"/>
             <a:fld id="{81A56B8B-90F6-41EC-AC37-F033ED2A57FF}" type="datetime1">
               <a:rPr lang="pt-BR" smtClean="0"/>
-              <a:t>21/09/2020</a:t>
+              <a:t>22/09/2020</a:t>
             </a:fld>
             <a:endParaRPr lang="en-US" dirty="0"/>
           </a:p>
@@ -381,7 +381,7 @@
             <a:pPr rtl="0"/>
             <a:fld id="{CBA983AA-2481-4371-917C-6457CA055053}" type="datetime1">
               <a:rPr lang="pt-BR" smtClean="0"/>
-              <a:t>21/09/2020</a:t>
+              <a:t>22/09/2020</a:t>
             </a:fld>
             <a:endParaRPr lang="en-US"/>
           </a:p>
@@ -1126,7 +1126,7 @@
             <a:pPr rtl="0"/>
             <a:fld id="{A97FF641-F313-4AD0-BA92-8145B9101A50}" type="datetime1">
               <a:rPr lang="pt-BR" smtClean="0"/>
-              <a:t>21/09/2020</a:t>
+              <a:t>22/09/2020</a:t>
             </a:fld>
             <a:endParaRPr lang="en-US" dirty="0"/>
           </a:p>
@@ -1332,7 +1332,7 @@
             <a:pPr rtl="0"/>
             <a:fld id="{9D288EE4-F830-4159-BFF9-E721BA7AE0AB}" type="datetime1">
               <a:rPr lang="pt-BR" smtClean="0"/>
-              <a:t>21/09/2020</a:t>
+              <a:t>22/09/2020</a:t>
             </a:fld>
             <a:endParaRPr lang="en-US"/>
           </a:p>
@@ -1516,7 +1516,7 @@
             <a:pPr rtl="0"/>
             <a:fld id="{006B8899-C6DA-43D3-8986-CFC20CD4B104}" type="datetime1">
               <a:rPr lang="pt-BR" smtClean="0"/>
-              <a:t>21/09/2020</a:t>
+              <a:t>22/09/2020</a:t>
             </a:fld>
             <a:endParaRPr lang="en-US"/>
           </a:p>
@@ -1690,7 +1690,7 @@
             <a:pPr rtl="0"/>
             <a:fld id="{B6E62EC5-0DC6-4A78-BB05-D67BCA50AA36}" type="datetime1">
               <a:rPr lang="pt-BR" smtClean="0"/>
-              <a:t>21/09/2020</a:t>
+              <a:t>22/09/2020</a:t>
             </a:fld>
             <a:endParaRPr lang="en-US"/>
           </a:p>
@@ -2293,7 +2293,7 @@
             <a:pPr rtl="0"/>
             <a:fld id="{0D1A4693-2F41-43D3-BCDB-D5059F2986DB}" type="datetime1">
               <a:rPr lang="pt-BR" smtClean="0"/>
-              <a:t>21/09/2020</a:t>
+              <a:t>22/09/2020</a:t>
             </a:fld>
             <a:endParaRPr lang="en-US" dirty="0"/>
           </a:p>
@@ -2617,7 +2617,7 @@
             <a:pPr rtl="0"/>
             <a:fld id="{5BBB8AB2-DE16-44F3-8F59-40B18FC602F6}" type="datetime1">
               <a:rPr lang="pt-BR" smtClean="0"/>
-              <a:t>21/09/2020</a:t>
+              <a:t>22/09/2020</a:t>
             </a:fld>
             <a:endParaRPr lang="en-US"/>
           </a:p>
@@ -3058,7 +3058,7 @@
             <a:pPr rtl="0"/>
             <a:fld id="{5ACA5D35-0539-48FA-A753-0871E1ECAF0D}" type="datetime1">
               <a:rPr lang="pt-BR" smtClean="0"/>
-              <a:t>21/09/2020</a:t>
+              <a:t>22/09/2020</a:t>
             </a:fld>
             <a:endParaRPr lang="en-US"/>
           </a:p>
@@ -3180,7 +3180,7 @@
             <a:pPr rtl="0"/>
             <a:fld id="{5BA371F0-AB78-4B7A-B042-3B5D124F9CC4}" type="datetime1">
               <a:rPr lang="pt-BR" smtClean="0"/>
-              <a:t>21/09/2020</a:t>
+              <a:t>22/09/2020</a:t>
             </a:fld>
             <a:endParaRPr lang="en-US"/>
           </a:p>
@@ -3278,7 +3278,7 @@
             <a:pPr rtl="0"/>
             <a:fld id="{C3E59013-4240-4BCB-9D6D-0402FB62C003}" type="datetime1">
               <a:rPr lang="pt-BR" smtClean="0"/>
-              <a:t>21/09/2020</a:t>
+              <a:t>22/09/2020</a:t>
             </a:fld>
             <a:endParaRPr lang="en-US"/>
           </a:p>
@@ -3699,7 +3699,7 @@
             <a:pPr rtl="0"/>
             <a:fld id="{590243F5-F020-403B-84E8-3610E6C6CB4F}" type="datetime1">
               <a:rPr lang="pt-BR" smtClean="0"/>
-              <a:t>21/09/2020</a:t>
+              <a:t>22/09/2020</a:t>
             </a:fld>
             <a:endParaRPr lang="en-US"/>
           </a:p>
@@ -3964,7 +3964,7 @@
             <a:pPr rtl="0"/>
             <a:fld id="{5D7AD476-FCE1-4F4C-AFD1-546A99681531}" type="datetime1">
               <a:rPr lang="pt-BR" smtClean="0"/>
-              <a:t>21/09/2020</a:t>
+              <a:t>22/09/2020</a:t>
             </a:fld>
             <a:endParaRPr lang="en-US" dirty="0"/>
           </a:p>
@@ -4484,7 +4484,7 @@
             <a:pPr rtl="0"/>
             <a:fld id="{2643713A-F4DD-4FBD-9DD6-C5B4A339B115}" type="datetime1">
               <a:rPr lang="pt-BR" smtClean="0"/>
-              <a:t>21/09/2020</a:t>
+              <a:t>22/09/2020</a:t>
             </a:fld>
             <a:endParaRPr lang="en-US" dirty="0"/>
           </a:p>
@@ -5843,7 +5843,7 @@
         <p:spPr>
           <a:xfrm>
             <a:off x="4559610" y="1694378"/>
-            <a:ext cx="7055141" cy="3416320"/>
+            <a:ext cx="7055141" cy="2862322"/>
           </a:xfrm>
           <a:prstGeom prst="rect">
             <a:avLst/>
@@ -5895,7 +5895,7 @@
             </a:pPr>
             <a:r>
               <a:rPr lang="pt-BR" dirty="0"/>
-              <a:t>Os custos de desenvolvimento de medicamentos fitoterápicos são, em média, 10 vezes mais baratos que os medicamentos tradicionais</a:t>
+              <a:t>Fitoterápicos e custos  </a:t>
             </a:r>
           </a:p>
           <a:p>
@@ -6851,7 +6851,7 @@
         <p:spPr>
           <a:xfrm>
             <a:off x="4521666" y="1652631"/>
-            <a:ext cx="7235593" cy="2862322"/>
+            <a:ext cx="7235593" cy="2031325"/>
           </a:xfrm>
           <a:prstGeom prst="rect">
             <a:avLst/>
@@ -6870,7 +6870,7 @@
             </a:pPr>
             <a:r>
               <a:rPr lang="pt-BR" dirty="0"/>
-              <a:t>o mercado mundial de medicamentos à base de plantas é avaliado em pouco mais de US$ 130 bilhões</a:t>
+              <a:t>o mercado mundial</a:t>
             </a:r>
           </a:p>
           <a:p>
@@ -6904,11 +6904,8 @@
             </a:pPr>
             <a:r>
               <a:rPr lang="pt-BR" dirty="0"/>
-              <a:t>O mercado brasileiro hoje movimenta hoje em média 700 milhões a 1 bilhão de reais com aumento de 20% ao ano </a:t>
-            </a:r>
-          </a:p>
-          <a:p>
-            <a:endParaRPr lang="pt-BR" dirty="0"/>
+              <a:t>O mercado brasileiro</a:t>
+            </a:r>
           </a:p>
           <a:p>
             <a:endParaRPr lang="pt-BR" dirty="0"/>

</xml_diff>

<commit_message>
optmizei os arquivos no git
</commit_message>
<xml_diff>
--- a/apresentacao/contextualizacao.pptx
+++ b/apresentacao/contextualizacao.pptx
@@ -5,10 +5,10 @@
     <p:sldMasterId id="2147483673" r:id="rId1"/>
   </p:sldMasterIdLst>
   <p:notesMasterIdLst>
-    <p:notesMasterId r:id="rId9"/>
+    <p:notesMasterId r:id="rId11"/>
   </p:notesMasterIdLst>
   <p:handoutMasterIdLst>
-    <p:handoutMasterId r:id="rId10"/>
+    <p:handoutMasterId r:id="rId12"/>
   </p:handoutMasterIdLst>
   <p:sldIdLst>
     <p:sldId id="257" r:id="rId2"/>
@@ -18,6 +18,8 @@
     <p:sldId id="260" r:id="rId6"/>
     <p:sldId id="261" r:id="rId7"/>
     <p:sldId id="262" r:id="rId8"/>
+    <p:sldId id="265" r:id="rId9"/>
+    <p:sldId id="266" r:id="rId10"/>
   </p:sldIdLst>
   <p:sldSz cx="12192000" cy="6858000"/>
   <p:notesSz cx="6858000" cy="9144000"/>
@@ -211,7 +213,7 @@
             <a:pPr rtl="0"/>
             <a:fld id="{81A56B8B-90F6-41EC-AC37-F033ED2A57FF}" type="datetime1">
               <a:rPr lang="pt-BR" smtClean="0"/>
-              <a:t>22/09/2020</a:t>
+              <a:t>23/09/2020</a:t>
             </a:fld>
             <a:endParaRPr lang="en-US" dirty="0"/>
           </a:p>
@@ -381,7 +383,7 @@
             <a:pPr rtl="0"/>
             <a:fld id="{CBA983AA-2481-4371-917C-6457CA055053}" type="datetime1">
               <a:rPr lang="pt-BR" smtClean="0"/>
-              <a:t>22/09/2020</a:t>
+              <a:t>23/09/2020</a:t>
             </a:fld>
             <a:endParaRPr lang="en-US"/>
           </a:p>
@@ -1126,7 +1128,7 @@
             <a:pPr rtl="0"/>
             <a:fld id="{A97FF641-F313-4AD0-BA92-8145B9101A50}" type="datetime1">
               <a:rPr lang="pt-BR" smtClean="0"/>
-              <a:t>22/09/2020</a:t>
+              <a:t>23/09/2020</a:t>
             </a:fld>
             <a:endParaRPr lang="en-US" dirty="0"/>
           </a:p>
@@ -1332,7 +1334,7 @@
             <a:pPr rtl="0"/>
             <a:fld id="{9D288EE4-F830-4159-BFF9-E721BA7AE0AB}" type="datetime1">
               <a:rPr lang="pt-BR" smtClean="0"/>
-              <a:t>22/09/2020</a:t>
+              <a:t>23/09/2020</a:t>
             </a:fld>
             <a:endParaRPr lang="en-US"/>
           </a:p>
@@ -1516,7 +1518,7 @@
             <a:pPr rtl="0"/>
             <a:fld id="{006B8899-C6DA-43D3-8986-CFC20CD4B104}" type="datetime1">
               <a:rPr lang="pt-BR" smtClean="0"/>
-              <a:t>22/09/2020</a:t>
+              <a:t>23/09/2020</a:t>
             </a:fld>
             <a:endParaRPr lang="en-US"/>
           </a:p>
@@ -1690,7 +1692,7 @@
             <a:pPr rtl="0"/>
             <a:fld id="{B6E62EC5-0DC6-4A78-BB05-D67BCA50AA36}" type="datetime1">
               <a:rPr lang="pt-BR" smtClean="0"/>
-              <a:t>22/09/2020</a:t>
+              <a:t>23/09/2020</a:t>
             </a:fld>
             <a:endParaRPr lang="en-US"/>
           </a:p>
@@ -2293,7 +2295,7 @@
             <a:pPr rtl="0"/>
             <a:fld id="{0D1A4693-2F41-43D3-BCDB-D5059F2986DB}" type="datetime1">
               <a:rPr lang="pt-BR" smtClean="0"/>
-              <a:t>22/09/2020</a:t>
+              <a:t>23/09/2020</a:t>
             </a:fld>
             <a:endParaRPr lang="en-US" dirty="0"/>
           </a:p>
@@ -2617,7 +2619,7 @@
             <a:pPr rtl="0"/>
             <a:fld id="{5BBB8AB2-DE16-44F3-8F59-40B18FC602F6}" type="datetime1">
               <a:rPr lang="pt-BR" smtClean="0"/>
-              <a:t>22/09/2020</a:t>
+              <a:t>23/09/2020</a:t>
             </a:fld>
             <a:endParaRPr lang="en-US"/>
           </a:p>
@@ -3058,7 +3060,7 @@
             <a:pPr rtl="0"/>
             <a:fld id="{5ACA5D35-0539-48FA-A753-0871E1ECAF0D}" type="datetime1">
               <a:rPr lang="pt-BR" smtClean="0"/>
-              <a:t>22/09/2020</a:t>
+              <a:t>23/09/2020</a:t>
             </a:fld>
             <a:endParaRPr lang="en-US"/>
           </a:p>
@@ -3180,7 +3182,7 @@
             <a:pPr rtl="0"/>
             <a:fld id="{5BA371F0-AB78-4B7A-B042-3B5D124F9CC4}" type="datetime1">
               <a:rPr lang="pt-BR" smtClean="0"/>
-              <a:t>22/09/2020</a:t>
+              <a:t>23/09/2020</a:t>
             </a:fld>
             <a:endParaRPr lang="en-US"/>
           </a:p>
@@ -3278,7 +3280,7 @@
             <a:pPr rtl="0"/>
             <a:fld id="{C3E59013-4240-4BCB-9D6D-0402FB62C003}" type="datetime1">
               <a:rPr lang="pt-BR" smtClean="0"/>
-              <a:t>22/09/2020</a:t>
+              <a:t>23/09/2020</a:t>
             </a:fld>
             <a:endParaRPr lang="en-US"/>
           </a:p>
@@ -3699,7 +3701,7 @@
             <a:pPr rtl="0"/>
             <a:fld id="{590243F5-F020-403B-84E8-3610E6C6CB4F}" type="datetime1">
               <a:rPr lang="pt-BR" smtClean="0"/>
-              <a:t>22/09/2020</a:t>
+              <a:t>23/09/2020</a:t>
             </a:fld>
             <a:endParaRPr lang="en-US"/>
           </a:p>
@@ -3964,7 +3966,7 @@
             <a:pPr rtl="0"/>
             <a:fld id="{5D7AD476-FCE1-4F4C-AFD1-546A99681531}" type="datetime1">
               <a:rPr lang="pt-BR" smtClean="0"/>
-              <a:t>22/09/2020</a:t>
+              <a:t>23/09/2020</a:t>
             </a:fld>
             <a:endParaRPr lang="en-US" dirty="0"/>
           </a:p>
@@ -4484,7 +4486,7 @@
             <a:pPr rtl="0"/>
             <a:fld id="{2643713A-F4DD-4FBD-9DD6-C5B4A339B115}" type="datetime1">
               <a:rPr lang="pt-BR" smtClean="0"/>
-              <a:t>22/09/2020</a:t>
+              <a:t>23/09/2020</a:t>
             </a:fld>
             <a:endParaRPr lang="en-US" dirty="0"/>
           </a:p>
@@ -7252,6 +7254,521 @@
     <p:extLst>
       <p:ext uri="{BB962C8B-B14F-4D97-AF65-F5344CB8AC3E}">
         <p14:creationId xmlns:p14="http://schemas.microsoft.com/office/powerpoint/2010/main" val="2417322938"/>
+      </p:ext>
+    </p:extLst>
+  </p:cSld>
+  <p:clrMapOvr>
+    <a:overrideClrMapping bg1="lt1" tx1="dk1" bg2="lt2" tx2="dk2" accent1="accent1" accent2="accent2" accent3="accent3" accent4="accent4" accent5="accent5" accent6="accent6" hlink="hlink" folHlink="folHlink"/>
+  </p:clrMapOvr>
+  <mc:AlternateContent xmlns:mc="http://schemas.openxmlformats.org/markup-compatibility/2006" xmlns:p15="http://schemas.microsoft.com/office/powerpoint/2012/main">
+    <mc:Choice Requires="p15">
+      <p:transition spd="slow">
+        <p15:prstTrans prst="fallOver"/>
+      </p:transition>
+    </mc:Choice>
+    <mc:Fallback xmlns="">
+      <p:transition spd="slow">
+        <p:fade/>
+      </p:transition>
+    </mc:Fallback>
+  </mc:AlternateContent>
+</p:sld>
+</file>
+
+<file path=ppt/slides/slide8.xml><?xml version="1.0" encoding="utf-8"?>
+<p:sld xmlns:a="http://schemas.openxmlformats.org/drawingml/2006/main" xmlns:r="http://schemas.openxmlformats.org/officeDocument/2006/relationships" xmlns:p="http://schemas.openxmlformats.org/presentationml/2006/main">
+  <p:cSld>
+    <p:bg>
+      <p:bgPr>
+        <a:solidFill>
+          <a:schemeClr val="bg1"/>
+        </a:solidFill>
+        <a:effectLst/>
+      </p:bgPr>
+    </p:bg>
+    <p:spTree>
+      <p:nvGrpSpPr>
+        <p:cNvPr id="1" name=""/>
+        <p:cNvGrpSpPr/>
+        <p:nvPr/>
+      </p:nvGrpSpPr>
+      <p:grpSpPr>
+        <a:xfrm>
+          <a:off x="0" y="0"/>
+          <a:ext cx="0" cy="0"/>
+          <a:chOff x="0" y="0"/>
+          <a:chExt cx="0" cy="0"/>
+        </a:xfrm>
+      </p:grpSpPr>
+      <p:pic>
+        <p:nvPicPr>
+          <p:cNvPr id="4" name="Imagem 3" descr="Uma imagem contendo malha, mesa, vermelha, coberta&#10;&#10;Descrição gerada automaticamente">
+            <a:extLst>
+              <a:ext uri="{FF2B5EF4-FFF2-40B4-BE49-F238E27FC236}">
+                <a16:creationId xmlns:a16="http://schemas.microsoft.com/office/drawing/2014/main" id="{5C002EE5-E4FF-463C-8DAA-9AC0B6D407FF}"/>
+              </a:ext>
+            </a:extLst>
+          </p:cNvPr>
+          <p:cNvPicPr>
+            <a:picLocks noChangeAspect="1"/>
+          </p:cNvPicPr>
+          <p:nvPr/>
+        </p:nvPicPr>
+        <p:blipFill rotWithShape="1">
+          <a:blip r:embed="rId2">
+            <a:extLst>
+              <a:ext uri="{28A0092B-C50C-407E-A947-70E740481C1C}">
+                <a14:useLocalDpi xmlns:a14="http://schemas.microsoft.com/office/drawing/2010/main" val="0"/>
+              </a:ext>
+            </a:extLst>
+          </a:blip>
+          <a:srcRect/>
+          <a:stretch/>
+        </p:blipFill>
+        <p:spPr>
+          <a:xfrm>
+            <a:off x="21" y="0"/>
+            <a:ext cx="12191979" cy="6857990"/>
+          </a:xfrm>
+          <a:prstGeom prst="rect">
+            <a:avLst/>
+          </a:prstGeom>
+        </p:spPr>
+      </p:pic>
+      <p:sp>
+        <p:nvSpPr>
+          <p:cNvPr id="29" name="Retângulo 22">
+            <a:extLst>
+              <a:ext uri="{FF2B5EF4-FFF2-40B4-BE49-F238E27FC236}">
+                <a16:creationId xmlns:a16="http://schemas.microsoft.com/office/drawing/2014/main" id="{F5380E9A-163E-4576-BCDD-0A450B7E9097}"/>
+              </a:ext>
+              <a:ext uri="{C183D7F6-B498-43B3-948B-1728B52AA6E4}">
+                <adec:decorative xmlns:adec="http://schemas.microsoft.com/office/drawing/2017/decorative" val="1"/>
+              </a:ext>
+            </a:extLst>
+          </p:cNvPr>
+          <p:cNvSpPr>
+            <a:spLocks noGrp="1" noRot="1" noChangeAspect="1" noMove="1" noResize="1" noEditPoints="1" noAdjustHandles="1" noChangeArrowheads="1" noChangeShapeType="1" noTextEdit="1"/>
+          </p:cNvSpPr>
+          <p:nvPr>
+            <p:extLst>
+              <p:ext uri="{386F3935-93C4-4BCD-93E2-E3B085C9AB24}">
+                <p16:designElem xmlns:p16="http://schemas.microsoft.com/office/powerpoint/2015/main" val="1"/>
+              </p:ext>
+            </p:extLst>
+          </p:nvPr>
+        </p:nvSpPr>
+        <p:spPr>
+          <a:xfrm>
+            <a:off x="4279943" y="237744"/>
+            <a:ext cx="7652977" cy="6382512"/>
+          </a:xfrm>
+          <a:prstGeom prst="rect">
+            <a:avLst/>
+          </a:prstGeom>
+          <a:solidFill>
+            <a:schemeClr val="bg1">
+              <a:alpha val="94000"/>
+            </a:schemeClr>
+          </a:solidFill>
+          <a:ln>
+            <a:noFill/>
+          </a:ln>
+        </p:spPr>
+        <p:style>
+          <a:lnRef idx="2">
+            <a:schemeClr val="accent1">
+              <a:shade val="50000"/>
+            </a:schemeClr>
+          </a:lnRef>
+          <a:fillRef idx="1">
+            <a:schemeClr val="accent1"/>
+          </a:fillRef>
+          <a:effectRef idx="0">
+            <a:schemeClr val="accent1"/>
+          </a:effectRef>
+          <a:fontRef idx="minor">
+            <a:schemeClr val="lt1"/>
+          </a:fontRef>
+        </p:style>
+      </p:sp>
+      <p:sp>
+        <p:nvSpPr>
+          <p:cNvPr id="30" name="Retângulo 24">
+            <a:extLst>
+              <a:ext uri="{FF2B5EF4-FFF2-40B4-BE49-F238E27FC236}">
+                <a16:creationId xmlns:a16="http://schemas.microsoft.com/office/drawing/2014/main" id="{88DDEF77-9746-4D83-91F9-442A2487E666}"/>
+              </a:ext>
+              <a:ext uri="{C183D7F6-B498-43B3-948B-1728B52AA6E4}">
+                <adec:decorative xmlns:adec="http://schemas.microsoft.com/office/drawing/2017/decorative" val="1"/>
+              </a:ext>
+            </a:extLst>
+          </p:cNvPr>
+          <p:cNvSpPr>
+            <a:spLocks noGrp="1" noRot="1" noChangeAspect="1" noMove="1" noResize="1" noEditPoints="1" noAdjustHandles="1" noChangeArrowheads="1" noChangeShapeType="1" noTextEdit="1"/>
+          </p:cNvSpPr>
+          <p:nvPr>
+            <p:extLst>
+              <p:ext uri="{386F3935-93C4-4BCD-93E2-E3B085C9AB24}">
+                <p16:designElem xmlns:p16="http://schemas.microsoft.com/office/powerpoint/2015/main" val="1"/>
+              </p:ext>
+            </p:extLst>
+          </p:nvPr>
+        </p:nvSpPr>
+        <p:spPr>
+          <a:xfrm>
+            <a:off x="4417103" y="374904"/>
+            <a:ext cx="7340156" cy="6108192"/>
+          </a:xfrm>
+          <a:prstGeom prst="rect">
+            <a:avLst/>
+          </a:prstGeom>
+          <a:noFill/>
+          <a:ln w="6350" cap="sq">
+            <a:solidFill>
+              <a:schemeClr val="tx1">
+                <a:lumMod val="65000"/>
+                <a:lumOff val="35000"/>
+              </a:schemeClr>
+            </a:solidFill>
+            <a:miter lim="800000"/>
+          </a:ln>
+        </p:spPr>
+        <p:style>
+          <a:lnRef idx="2">
+            <a:schemeClr val="accent1">
+              <a:shade val="50000"/>
+            </a:schemeClr>
+          </a:lnRef>
+          <a:fillRef idx="1">
+            <a:schemeClr val="accent1"/>
+          </a:fillRef>
+          <a:effectRef idx="0">
+            <a:schemeClr val="accent1"/>
+          </a:effectRef>
+          <a:fontRef idx="minor">
+            <a:schemeClr val="lt1"/>
+          </a:fontRef>
+        </p:style>
+      </p:sp>
+      <p:sp>
+        <p:nvSpPr>
+          <p:cNvPr id="2" name="Título 1">
+            <a:extLst>
+              <a:ext uri="{FF2B5EF4-FFF2-40B4-BE49-F238E27FC236}">
+                <a16:creationId xmlns:a16="http://schemas.microsoft.com/office/drawing/2014/main" id="{92C9295F-E638-4F61-AFE2-CF3E40556031}"/>
+              </a:ext>
+            </a:extLst>
+          </p:cNvPr>
+          <p:cNvSpPr>
+            <a:spLocks noGrp="1"/>
+          </p:cNvSpPr>
+          <p:nvPr>
+            <p:ph type="title"/>
+          </p:nvPr>
+        </p:nvSpPr>
+        <p:spPr>
+          <a:xfrm>
+            <a:off x="4455534" y="1760515"/>
+            <a:ext cx="6718433" cy="2534648"/>
+          </a:xfrm>
+        </p:spPr>
+        <p:txBody>
+          <a:bodyPr rtlCol="0">
+            <a:noAutofit/>
+          </a:bodyPr>
+          <a:lstStyle/>
+          <a:p>
+            <a:pPr rtl="0"/>
+            <a:r>
+              <a:rPr lang="pt-BR" sz="8000" dirty="0">
+                <a:solidFill>
+                  <a:schemeClr val="tx1">
+                    <a:lumMod val="75000"/>
+                    <a:lumOff val="25000"/>
+                  </a:schemeClr>
+                </a:solidFill>
+              </a:rPr>
+              <a:t>Desafio do projeto</a:t>
+            </a:r>
+            <a:endParaRPr lang="en-US" sz="8000" dirty="0">
+              <a:solidFill>
+                <a:schemeClr val="tx1">
+                  <a:lumMod val="75000"/>
+                  <a:lumOff val="25000"/>
+                </a:schemeClr>
+              </a:solidFill>
+            </a:endParaRPr>
+          </a:p>
+        </p:txBody>
+      </p:sp>
+    </p:spTree>
+    <p:extLst>
+      <p:ext uri="{BB962C8B-B14F-4D97-AF65-F5344CB8AC3E}">
+        <p14:creationId xmlns:p14="http://schemas.microsoft.com/office/powerpoint/2010/main" val="2268374304"/>
+      </p:ext>
+    </p:extLst>
+  </p:cSld>
+  <p:clrMapOvr>
+    <a:overrideClrMapping bg1="lt1" tx1="dk1" bg2="lt2" tx2="dk2" accent1="accent1" accent2="accent2" accent3="accent3" accent4="accent4" accent5="accent5" accent6="accent6" hlink="hlink" folHlink="folHlink"/>
+  </p:clrMapOvr>
+  <mc:AlternateContent xmlns:mc="http://schemas.openxmlformats.org/markup-compatibility/2006" xmlns:p15="http://schemas.microsoft.com/office/powerpoint/2012/main">
+    <mc:Choice Requires="p15">
+      <p:transition spd="slow">
+        <p15:prstTrans prst="fallOver"/>
+      </p:transition>
+    </mc:Choice>
+    <mc:Fallback xmlns="">
+      <p:transition spd="slow">
+        <p:fade/>
+      </p:transition>
+    </mc:Fallback>
+  </mc:AlternateContent>
+</p:sld>
+</file>
+
+<file path=ppt/slides/slide9.xml><?xml version="1.0" encoding="utf-8"?>
+<p:sld xmlns:a="http://schemas.openxmlformats.org/drawingml/2006/main" xmlns:r="http://schemas.openxmlformats.org/officeDocument/2006/relationships" xmlns:p="http://schemas.openxmlformats.org/presentationml/2006/main">
+  <p:cSld>
+    <p:bg>
+      <p:bgPr>
+        <a:solidFill>
+          <a:schemeClr val="bg1"/>
+        </a:solidFill>
+        <a:effectLst/>
+      </p:bgPr>
+    </p:bg>
+    <p:spTree>
+      <p:nvGrpSpPr>
+        <p:cNvPr id="1" name=""/>
+        <p:cNvGrpSpPr/>
+        <p:nvPr/>
+      </p:nvGrpSpPr>
+      <p:grpSpPr>
+        <a:xfrm>
+          <a:off x="0" y="0"/>
+          <a:ext cx="0" cy="0"/>
+          <a:chOff x="0" y="0"/>
+          <a:chExt cx="0" cy="0"/>
+        </a:xfrm>
+      </p:grpSpPr>
+      <p:pic>
+        <p:nvPicPr>
+          <p:cNvPr id="4" name="Imagem 3" descr="Uma imagem contendo malha, mesa, vermelha, coberta&#10;&#10;Descrição gerada automaticamente">
+            <a:extLst>
+              <a:ext uri="{FF2B5EF4-FFF2-40B4-BE49-F238E27FC236}">
+                <a16:creationId xmlns:a16="http://schemas.microsoft.com/office/drawing/2014/main" id="{5C002EE5-E4FF-463C-8DAA-9AC0B6D407FF}"/>
+              </a:ext>
+            </a:extLst>
+          </p:cNvPr>
+          <p:cNvPicPr>
+            <a:picLocks noChangeAspect="1"/>
+          </p:cNvPicPr>
+          <p:nvPr/>
+        </p:nvPicPr>
+        <p:blipFill rotWithShape="1">
+          <a:blip r:embed="rId2">
+            <a:extLst>
+              <a:ext uri="{28A0092B-C50C-407E-A947-70E740481C1C}">
+                <a14:useLocalDpi xmlns:a14="http://schemas.microsoft.com/office/drawing/2010/main" val="0"/>
+              </a:ext>
+            </a:extLst>
+          </a:blip>
+          <a:srcRect/>
+          <a:stretch/>
+        </p:blipFill>
+        <p:spPr>
+          <a:xfrm>
+            <a:off x="-259059" y="237744"/>
+            <a:ext cx="12191979" cy="6857990"/>
+          </a:xfrm>
+          <a:prstGeom prst="rect">
+            <a:avLst/>
+          </a:prstGeom>
+        </p:spPr>
+      </p:pic>
+      <p:sp>
+        <p:nvSpPr>
+          <p:cNvPr id="29" name="Retângulo 22">
+            <a:extLst>
+              <a:ext uri="{FF2B5EF4-FFF2-40B4-BE49-F238E27FC236}">
+                <a16:creationId xmlns:a16="http://schemas.microsoft.com/office/drawing/2014/main" id="{F5380E9A-163E-4576-BCDD-0A450B7E9097}"/>
+              </a:ext>
+              <a:ext uri="{C183D7F6-B498-43B3-948B-1728B52AA6E4}">
+                <adec:decorative xmlns:adec="http://schemas.microsoft.com/office/drawing/2017/decorative" val="1"/>
+              </a:ext>
+            </a:extLst>
+          </p:cNvPr>
+          <p:cNvSpPr>
+            <a:spLocks noGrp="1" noRot="1" noChangeAspect="1" noMove="1" noResize="1" noEditPoints="1" noAdjustHandles="1" noChangeArrowheads="1" noChangeShapeType="1" noTextEdit="1"/>
+          </p:cNvSpPr>
+          <p:nvPr>
+            <p:extLst>
+              <p:ext uri="{386F3935-93C4-4BCD-93E2-E3B085C9AB24}">
+                <p16:designElem xmlns:p16="http://schemas.microsoft.com/office/powerpoint/2015/main" val="1"/>
+              </p:ext>
+            </p:extLst>
+          </p:nvPr>
+        </p:nvSpPr>
+        <p:spPr>
+          <a:xfrm>
+            <a:off x="4279943" y="237744"/>
+            <a:ext cx="7652977" cy="6382512"/>
+          </a:xfrm>
+          <a:prstGeom prst="rect">
+            <a:avLst/>
+          </a:prstGeom>
+          <a:solidFill>
+            <a:schemeClr val="bg1">
+              <a:alpha val="94000"/>
+            </a:schemeClr>
+          </a:solidFill>
+          <a:ln>
+            <a:noFill/>
+          </a:ln>
+        </p:spPr>
+        <p:style>
+          <a:lnRef idx="2">
+            <a:schemeClr val="accent1">
+              <a:shade val="50000"/>
+            </a:schemeClr>
+          </a:lnRef>
+          <a:fillRef idx="1">
+            <a:schemeClr val="accent1"/>
+          </a:fillRef>
+          <a:effectRef idx="0">
+            <a:schemeClr val="accent1"/>
+          </a:effectRef>
+          <a:fontRef idx="minor">
+            <a:schemeClr val="lt1"/>
+          </a:fontRef>
+        </p:style>
+      </p:sp>
+      <p:sp>
+        <p:nvSpPr>
+          <p:cNvPr id="30" name="Retângulo 24">
+            <a:extLst>
+              <a:ext uri="{FF2B5EF4-FFF2-40B4-BE49-F238E27FC236}">
+                <a16:creationId xmlns:a16="http://schemas.microsoft.com/office/drawing/2014/main" id="{88DDEF77-9746-4D83-91F9-442A2487E666}"/>
+              </a:ext>
+              <a:ext uri="{C183D7F6-B498-43B3-948B-1728B52AA6E4}">
+                <adec:decorative xmlns:adec="http://schemas.microsoft.com/office/drawing/2017/decorative" val="1"/>
+              </a:ext>
+            </a:extLst>
+          </p:cNvPr>
+          <p:cNvSpPr>
+            <a:spLocks noGrp="1" noRot="1" noChangeAspect="1" noMove="1" noResize="1" noEditPoints="1" noAdjustHandles="1" noChangeArrowheads="1" noChangeShapeType="1" noTextEdit="1"/>
+          </p:cNvSpPr>
+          <p:nvPr>
+            <p:extLst>
+              <p:ext uri="{386F3935-93C4-4BCD-93E2-E3B085C9AB24}">
+                <p16:designElem xmlns:p16="http://schemas.microsoft.com/office/powerpoint/2015/main" val="1"/>
+              </p:ext>
+            </p:extLst>
+          </p:nvPr>
+        </p:nvSpPr>
+        <p:spPr>
+          <a:xfrm>
+            <a:off x="4417103" y="374904"/>
+            <a:ext cx="7340156" cy="6108192"/>
+          </a:xfrm>
+          <a:prstGeom prst="rect">
+            <a:avLst/>
+          </a:prstGeom>
+          <a:noFill/>
+          <a:ln w="6350" cap="sq">
+            <a:solidFill>
+              <a:schemeClr val="tx1">
+                <a:lumMod val="65000"/>
+                <a:lumOff val="35000"/>
+              </a:schemeClr>
+            </a:solidFill>
+            <a:miter lim="800000"/>
+          </a:ln>
+        </p:spPr>
+        <p:style>
+          <a:lnRef idx="2">
+            <a:schemeClr val="accent1">
+              <a:shade val="50000"/>
+            </a:schemeClr>
+          </a:lnRef>
+          <a:fillRef idx="1">
+            <a:schemeClr val="accent1"/>
+          </a:fillRef>
+          <a:effectRef idx="0">
+            <a:schemeClr val="accent1"/>
+          </a:effectRef>
+          <a:fontRef idx="minor">
+            <a:schemeClr val="lt1"/>
+          </a:fontRef>
+        </p:style>
+      </p:sp>
+      <p:sp>
+        <p:nvSpPr>
+          <p:cNvPr id="2" name="Título 1">
+            <a:extLst>
+              <a:ext uri="{FF2B5EF4-FFF2-40B4-BE49-F238E27FC236}">
+                <a16:creationId xmlns:a16="http://schemas.microsoft.com/office/drawing/2014/main" id="{92C9295F-E638-4F61-AFE2-CF3E40556031}"/>
+              </a:ext>
+            </a:extLst>
+          </p:cNvPr>
+          <p:cNvSpPr>
+            <a:spLocks noGrp="1"/>
+          </p:cNvSpPr>
+          <p:nvPr>
+            <p:ph type="title"/>
+          </p:nvPr>
+        </p:nvSpPr>
+        <p:spPr>
+          <a:xfrm>
+            <a:off x="4417103" y="2212093"/>
+            <a:ext cx="6718433" cy="937803"/>
+          </a:xfrm>
+        </p:spPr>
+        <p:txBody>
+          <a:bodyPr rtlCol="0">
+            <a:normAutofit fontScale="90000"/>
+          </a:bodyPr>
+          <a:lstStyle/>
+          <a:p>
+            <a:pPr rtl="0"/>
+            <a:r>
+              <a:rPr lang="pt-BR" sz="8800" dirty="0">
+                <a:solidFill>
+                  <a:schemeClr val="tx1">
+                    <a:lumMod val="75000"/>
+                    <a:lumOff val="25000"/>
+                  </a:schemeClr>
+                </a:solidFill>
+              </a:rPr>
+              <a:t>Solução</a:t>
+            </a:r>
+            <a:r>
+              <a:rPr lang="pt-BR" dirty="0">
+                <a:solidFill>
+                  <a:schemeClr val="tx1">
+                    <a:lumMod val="75000"/>
+                    <a:lumOff val="25000"/>
+                  </a:schemeClr>
+                </a:solidFill>
+              </a:rPr>
+              <a:t> </a:t>
+            </a:r>
+            <a:endParaRPr lang="en-US" dirty="0">
+              <a:solidFill>
+                <a:schemeClr val="tx1">
+                  <a:lumMod val="75000"/>
+                  <a:lumOff val="25000"/>
+                </a:schemeClr>
+              </a:solidFill>
+            </a:endParaRPr>
+          </a:p>
+        </p:txBody>
+      </p:sp>
+    </p:spTree>
+    <p:extLst>
+      <p:ext uri="{BB962C8B-B14F-4D97-AF65-F5344CB8AC3E}">
+        <p14:creationId xmlns:p14="http://schemas.microsoft.com/office/powerpoint/2010/main" val="3874972918"/>
       </p:ext>
     </p:extLst>
   </p:cSld>

</xml_diff>

<commit_message>
adicionado o prototipo de site do guilherme soares
</commit_message>
<xml_diff>
--- a/apresentacao/contextualizacao.pptx
+++ b/apresentacao/contextualizacao.pptx
@@ -214,7 +214,7 @@
             <a:pPr rtl="0"/>
             <a:fld id="{81A56B8B-90F6-41EC-AC37-F033ED2A57FF}" type="datetime1">
               <a:rPr lang="pt-BR" smtClean="0"/>
-              <a:t>23/09/2020</a:t>
+              <a:t>01/10/2020</a:t>
             </a:fld>
             <a:endParaRPr lang="en-US" dirty="0"/>
           </a:p>
@@ -384,7 +384,7 @@
             <a:pPr rtl="0"/>
             <a:fld id="{CBA983AA-2481-4371-917C-6457CA055053}" type="datetime1">
               <a:rPr lang="pt-BR" smtClean="0"/>
-              <a:t>23/09/2020</a:t>
+              <a:t>01/10/2020</a:t>
             </a:fld>
             <a:endParaRPr lang="en-US"/>
           </a:p>
@@ -1129,7 +1129,7 @@
             <a:pPr rtl="0"/>
             <a:fld id="{A97FF641-F313-4AD0-BA92-8145B9101A50}" type="datetime1">
               <a:rPr lang="pt-BR" smtClean="0"/>
-              <a:t>23/09/2020</a:t>
+              <a:t>01/10/2020</a:t>
             </a:fld>
             <a:endParaRPr lang="en-US" dirty="0"/>
           </a:p>
@@ -1335,7 +1335,7 @@
             <a:pPr rtl="0"/>
             <a:fld id="{9D288EE4-F830-4159-BFF9-E721BA7AE0AB}" type="datetime1">
               <a:rPr lang="pt-BR" smtClean="0"/>
-              <a:t>23/09/2020</a:t>
+              <a:t>01/10/2020</a:t>
             </a:fld>
             <a:endParaRPr lang="en-US"/>
           </a:p>
@@ -1519,7 +1519,7 @@
             <a:pPr rtl="0"/>
             <a:fld id="{006B8899-C6DA-43D3-8986-CFC20CD4B104}" type="datetime1">
               <a:rPr lang="pt-BR" smtClean="0"/>
-              <a:t>23/09/2020</a:t>
+              <a:t>01/10/2020</a:t>
             </a:fld>
             <a:endParaRPr lang="en-US"/>
           </a:p>
@@ -1693,7 +1693,7 @@
             <a:pPr rtl="0"/>
             <a:fld id="{B6E62EC5-0DC6-4A78-BB05-D67BCA50AA36}" type="datetime1">
               <a:rPr lang="pt-BR" smtClean="0"/>
-              <a:t>23/09/2020</a:t>
+              <a:t>01/10/2020</a:t>
             </a:fld>
             <a:endParaRPr lang="en-US"/>
           </a:p>
@@ -2296,7 +2296,7 @@
             <a:pPr rtl="0"/>
             <a:fld id="{0D1A4693-2F41-43D3-BCDB-D5059F2986DB}" type="datetime1">
               <a:rPr lang="pt-BR" smtClean="0"/>
-              <a:t>23/09/2020</a:t>
+              <a:t>01/10/2020</a:t>
             </a:fld>
             <a:endParaRPr lang="en-US" dirty="0"/>
           </a:p>
@@ -2620,7 +2620,7 @@
             <a:pPr rtl="0"/>
             <a:fld id="{5BBB8AB2-DE16-44F3-8F59-40B18FC602F6}" type="datetime1">
               <a:rPr lang="pt-BR" smtClean="0"/>
-              <a:t>23/09/2020</a:t>
+              <a:t>01/10/2020</a:t>
             </a:fld>
             <a:endParaRPr lang="en-US"/>
           </a:p>
@@ -3061,7 +3061,7 @@
             <a:pPr rtl="0"/>
             <a:fld id="{5ACA5D35-0539-48FA-A753-0871E1ECAF0D}" type="datetime1">
               <a:rPr lang="pt-BR" smtClean="0"/>
-              <a:t>23/09/2020</a:t>
+              <a:t>01/10/2020</a:t>
             </a:fld>
             <a:endParaRPr lang="en-US"/>
           </a:p>
@@ -3183,7 +3183,7 @@
             <a:pPr rtl="0"/>
             <a:fld id="{5BA371F0-AB78-4B7A-B042-3B5D124F9CC4}" type="datetime1">
               <a:rPr lang="pt-BR" smtClean="0"/>
-              <a:t>23/09/2020</a:t>
+              <a:t>01/10/2020</a:t>
             </a:fld>
             <a:endParaRPr lang="en-US"/>
           </a:p>
@@ -3281,7 +3281,7 @@
             <a:pPr rtl="0"/>
             <a:fld id="{C3E59013-4240-4BCB-9D6D-0402FB62C003}" type="datetime1">
               <a:rPr lang="pt-BR" smtClean="0"/>
-              <a:t>23/09/2020</a:t>
+              <a:t>01/10/2020</a:t>
             </a:fld>
             <a:endParaRPr lang="en-US"/>
           </a:p>
@@ -3702,7 +3702,7 @@
             <a:pPr rtl="0"/>
             <a:fld id="{590243F5-F020-403B-84E8-3610E6C6CB4F}" type="datetime1">
               <a:rPr lang="pt-BR" smtClean="0"/>
-              <a:t>23/09/2020</a:t>
+              <a:t>01/10/2020</a:t>
             </a:fld>
             <a:endParaRPr lang="en-US"/>
           </a:p>
@@ -3967,7 +3967,7 @@
             <a:pPr rtl="0"/>
             <a:fld id="{5D7AD476-FCE1-4F4C-AFD1-546A99681531}" type="datetime1">
               <a:rPr lang="pt-BR" smtClean="0"/>
-              <a:t>23/09/2020</a:t>
+              <a:t>01/10/2020</a:t>
             </a:fld>
             <a:endParaRPr lang="en-US" dirty="0"/>
           </a:p>
@@ -4487,7 +4487,7 @@
             <a:pPr rtl="0"/>
             <a:fld id="{2643713A-F4DD-4FBD-9DD6-C5B4A339B115}" type="datetime1">
               <a:rPr lang="pt-BR" smtClean="0"/>
-              <a:t>23/09/2020</a:t>
+              <a:t>01/10/2020</a:t>
             </a:fld>
             <a:endParaRPr lang="en-US" dirty="0"/>
           </a:p>
@@ -5009,7 +5009,7 @@
                 <a16:creationId xmlns:a16="http://schemas.microsoft.com/office/drawing/2014/main" id="{2644B391-9BFE-445C-A9EC-F544BB85FBC7}"/>
               </a:ext>
               <a:ext uri="{C183D7F6-B498-43B3-948B-1728B52AA6E4}">
-                <adec:decorative xmlns:adec="http://schemas.microsoft.com/office/drawing/2017/decorative" val="1"/>
+                <adec:decorative xmlns:adec="http://schemas.microsoft.com/office/drawing/2017/decorative" xmlns="" val="1"/>
               </a:ext>
             </a:extLst>
           </p:cNvPr>
@@ -5054,7 +5054,7 @@
                 <a16:creationId xmlns:a16="http://schemas.microsoft.com/office/drawing/2014/main" id="{80F26E69-87D9-4655-AE7B-280A87AA3CAD}"/>
               </a:ext>
               <a:ext uri="{C183D7F6-B498-43B3-948B-1728B52AA6E4}">
-                <adec:decorative xmlns:adec="http://schemas.microsoft.com/office/drawing/2017/decorative" val="1"/>
+                <adec:decorative xmlns:adec="http://schemas.microsoft.com/office/drawing/2017/decorative" xmlns="" val="1"/>
               </a:ext>
             </a:extLst>
           </p:cNvPr>
@@ -5315,7 +5315,7 @@
             <a:pPr rtl="0"/>
             <a:fld id="{B6E62EC5-0DC6-4A78-BB05-D67BCA50AA36}" type="datetime1">
               <a:rPr lang="pt-BR" smtClean="0"/>
-              <a:t>23/09/2020</a:t>
+              <a:t>01/10/2020</a:t>
             </a:fld>
             <a:endParaRPr lang="en-US"/>
           </a:p>
@@ -5349,7 +5349,7 @@
           <a:graphicData uri="http://schemas.openxmlformats.org/presentationml/2006/ole">
             <mc:AlternateContent xmlns:mc="http://schemas.openxmlformats.org/markup-compatibility/2006">
               <mc:Choice xmlns:v="urn:schemas-microsoft-com:vml" Requires="v">
-                <p:oleObj spid="_x0000_s1028" name="Acrobat Document" r:id="rId3" imgW="13716000" imgH="7715250" progId="AcroExch.Document.DC">
+                <p:oleObj spid="_x0000_s1029" name="Acrobat Document" r:id="rId3" imgW="13716000" imgH="7715250" progId="AcroExch.Document.DC">
                   <p:embed/>
                 </p:oleObj>
               </mc:Choice>
@@ -5527,7 +5527,7 @@
                 <a16:creationId xmlns:a16="http://schemas.microsoft.com/office/drawing/2014/main" id="{F5380E9A-163E-4576-BCDD-0A450B7E9097}"/>
               </a:ext>
               <a:ext uri="{C183D7F6-B498-43B3-948B-1728B52AA6E4}">
-                <adec:decorative xmlns:adec="http://schemas.microsoft.com/office/drawing/2017/decorative" val="1"/>
+                <adec:decorative xmlns:adec="http://schemas.microsoft.com/office/drawing/2017/decorative" xmlns="" val="1"/>
               </a:ext>
             </a:extLst>
           </p:cNvPr>
@@ -5584,7 +5584,7 @@
                 <a16:creationId xmlns:a16="http://schemas.microsoft.com/office/drawing/2014/main" id="{88DDEF77-9746-4D83-91F9-442A2487E666}"/>
               </a:ext>
               <a:ext uri="{C183D7F6-B498-43B3-948B-1728B52AA6E4}">
-                <adec:decorative xmlns:adec="http://schemas.microsoft.com/office/drawing/2017/decorative" val="1"/>
+                <adec:decorative xmlns:adec="http://schemas.microsoft.com/office/drawing/2017/decorative" xmlns="" val="1"/>
               </a:ext>
             </a:extLst>
           </p:cNvPr>
@@ -5831,7 +5831,7 @@
                 <a16:creationId xmlns:a16="http://schemas.microsoft.com/office/drawing/2014/main" id="{F5380E9A-163E-4576-BCDD-0A450B7E9097}"/>
               </a:ext>
               <a:ext uri="{C183D7F6-B498-43B3-948B-1728B52AA6E4}">
-                <adec:decorative xmlns:adec="http://schemas.microsoft.com/office/drawing/2017/decorative" val="1"/>
+                <adec:decorative xmlns:adec="http://schemas.microsoft.com/office/drawing/2017/decorative" xmlns="" val="1"/>
               </a:ext>
             </a:extLst>
           </p:cNvPr>
@@ -5888,7 +5888,7 @@
                 <a16:creationId xmlns:a16="http://schemas.microsoft.com/office/drawing/2014/main" id="{88DDEF77-9746-4D83-91F9-442A2487E666}"/>
               </a:ext>
               <a:ext uri="{C183D7F6-B498-43B3-948B-1728B52AA6E4}">
-                <adec:decorative xmlns:adec="http://schemas.microsoft.com/office/drawing/2017/decorative" val="1"/>
+                <adec:decorative xmlns:adec="http://schemas.microsoft.com/office/drawing/2017/decorative" xmlns="" val="1"/>
               </a:ext>
             </a:extLst>
           </p:cNvPr>
@@ -6196,7 +6196,7 @@
                 <a16:creationId xmlns:a16="http://schemas.microsoft.com/office/drawing/2014/main" id="{F5380E9A-163E-4576-BCDD-0A450B7E9097}"/>
               </a:ext>
               <a:ext uri="{C183D7F6-B498-43B3-948B-1728B52AA6E4}">
-                <adec:decorative xmlns:adec="http://schemas.microsoft.com/office/drawing/2017/decorative" val="1"/>
+                <adec:decorative xmlns:adec="http://schemas.microsoft.com/office/drawing/2017/decorative" xmlns="" val="1"/>
               </a:ext>
             </a:extLst>
           </p:cNvPr>
@@ -6253,7 +6253,7 @@
                 <a16:creationId xmlns:a16="http://schemas.microsoft.com/office/drawing/2014/main" id="{88DDEF77-9746-4D83-91F9-442A2487E666}"/>
               </a:ext>
               <a:ext uri="{C183D7F6-B498-43B3-948B-1728B52AA6E4}">
-                <adec:decorative xmlns:adec="http://schemas.microsoft.com/office/drawing/2017/decorative" val="1"/>
+                <adec:decorative xmlns:adec="http://schemas.microsoft.com/office/drawing/2017/decorative" xmlns="" val="1"/>
               </a:ext>
             </a:extLst>
           </p:cNvPr>
@@ -6536,7 +6536,7 @@
                 <a16:creationId xmlns:a16="http://schemas.microsoft.com/office/drawing/2014/main" id="{F5380E9A-163E-4576-BCDD-0A450B7E9097}"/>
               </a:ext>
               <a:ext uri="{C183D7F6-B498-43B3-948B-1728B52AA6E4}">
-                <adec:decorative xmlns:adec="http://schemas.microsoft.com/office/drawing/2017/decorative" val="1"/>
+                <adec:decorative xmlns:adec="http://schemas.microsoft.com/office/drawing/2017/decorative" xmlns="" val="1"/>
               </a:ext>
             </a:extLst>
           </p:cNvPr>
@@ -6593,7 +6593,7 @@
                 <a16:creationId xmlns:a16="http://schemas.microsoft.com/office/drawing/2014/main" id="{88DDEF77-9746-4D83-91F9-442A2487E666}"/>
               </a:ext>
               <a:ext uri="{C183D7F6-B498-43B3-948B-1728B52AA6E4}">
-                <adec:decorative xmlns:adec="http://schemas.microsoft.com/office/drawing/2017/decorative" val="1"/>
+                <adec:decorative xmlns:adec="http://schemas.microsoft.com/office/drawing/2017/decorative" xmlns="" val="1"/>
               </a:ext>
             </a:extLst>
           </p:cNvPr>
@@ -6865,7 +6865,7 @@
                 <a16:creationId xmlns:a16="http://schemas.microsoft.com/office/drawing/2014/main" id="{F5380E9A-163E-4576-BCDD-0A450B7E9097}"/>
               </a:ext>
               <a:ext uri="{C183D7F6-B498-43B3-948B-1728B52AA6E4}">
-                <adec:decorative xmlns:adec="http://schemas.microsoft.com/office/drawing/2017/decorative" val="1"/>
+                <adec:decorative xmlns:adec="http://schemas.microsoft.com/office/drawing/2017/decorative" xmlns="" val="1"/>
               </a:ext>
             </a:extLst>
           </p:cNvPr>
@@ -6922,7 +6922,7 @@
                 <a16:creationId xmlns:a16="http://schemas.microsoft.com/office/drawing/2014/main" id="{88DDEF77-9746-4D83-91F9-442A2487E666}"/>
               </a:ext>
               <a:ext uri="{C183D7F6-B498-43B3-948B-1728B52AA6E4}">
-                <adec:decorative xmlns:adec="http://schemas.microsoft.com/office/drawing/2017/decorative" val="1"/>
+                <adec:decorative xmlns:adec="http://schemas.microsoft.com/office/drawing/2017/decorative" xmlns="" val="1"/>
               </a:ext>
             </a:extLst>
           </p:cNvPr>
@@ -7196,7 +7196,7 @@
                 <a16:creationId xmlns:a16="http://schemas.microsoft.com/office/drawing/2014/main" id="{F5380E9A-163E-4576-BCDD-0A450B7E9097}"/>
               </a:ext>
               <a:ext uri="{C183D7F6-B498-43B3-948B-1728B52AA6E4}">
-                <adec:decorative xmlns:adec="http://schemas.microsoft.com/office/drawing/2017/decorative" val="1"/>
+                <adec:decorative xmlns:adec="http://schemas.microsoft.com/office/drawing/2017/decorative" xmlns="" val="1"/>
               </a:ext>
             </a:extLst>
           </p:cNvPr>
@@ -7253,7 +7253,7 @@
                 <a16:creationId xmlns:a16="http://schemas.microsoft.com/office/drawing/2014/main" id="{88DDEF77-9746-4D83-91F9-442A2487E666}"/>
               </a:ext>
               <a:ext uri="{C183D7F6-B498-43B3-948B-1728B52AA6E4}">
-                <adec:decorative xmlns:adec="http://schemas.microsoft.com/office/drawing/2017/decorative" val="1"/>
+                <adec:decorative xmlns:adec="http://schemas.microsoft.com/office/drawing/2017/decorative" xmlns="" val="1"/>
               </a:ext>
             </a:extLst>
           </p:cNvPr>
@@ -7529,7 +7529,7 @@
                 <a16:creationId xmlns:a16="http://schemas.microsoft.com/office/drawing/2014/main" id="{F5380E9A-163E-4576-BCDD-0A450B7E9097}"/>
               </a:ext>
               <a:ext uri="{C183D7F6-B498-43B3-948B-1728B52AA6E4}">
-                <adec:decorative xmlns:adec="http://schemas.microsoft.com/office/drawing/2017/decorative" val="1"/>
+                <adec:decorative xmlns:adec="http://schemas.microsoft.com/office/drawing/2017/decorative" xmlns="" val="1"/>
               </a:ext>
             </a:extLst>
           </p:cNvPr>
@@ -7586,7 +7586,7 @@
                 <a16:creationId xmlns:a16="http://schemas.microsoft.com/office/drawing/2014/main" id="{88DDEF77-9746-4D83-91F9-442A2487E666}"/>
               </a:ext>
               <a:ext uri="{C183D7F6-B498-43B3-948B-1728B52AA6E4}">
-                <adec:decorative xmlns:adec="http://schemas.microsoft.com/office/drawing/2017/decorative" val="1"/>
+                <adec:decorative xmlns:adec="http://schemas.microsoft.com/office/drawing/2017/decorative" xmlns="" val="1"/>
               </a:ext>
             </a:extLst>
           </p:cNvPr>
@@ -7765,7 +7765,7 @@
         </p:blipFill>
         <p:spPr>
           <a:xfrm>
-            <a:off x="-259059" y="237744"/>
+            <a:off x="21" y="0"/>
             <a:ext cx="12191979" cy="6857990"/>
           </a:xfrm>
           <a:prstGeom prst="rect">
@@ -7781,7 +7781,7 @@
                 <a16:creationId xmlns:a16="http://schemas.microsoft.com/office/drawing/2014/main" id="{F5380E9A-163E-4576-BCDD-0A450B7E9097}"/>
               </a:ext>
               <a:ext uri="{C183D7F6-B498-43B3-948B-1728B52AA6E4}">
-                <adec:decorative xmlns:adec="http://schemas.microsoft.com/office/drawing/2017/decorative" val="1"/>
+                <adec:decorative xmlns:adec="http://schemas.microsoft.com/office/drawing/2017/decorative" xmlns="" val="1"/>
               </a:ext>
             </a:extLst>
           </p:cNvPr>
@@ -7838,7 +7838,7 @@
                 <a16:creationId xmlns:a16="http://schemas.microsoft.com/office/drawing/2014/main" id="{88DDEF77-9746-4D83-91F9-442A2487E666}"/>
               </a:ext>
               <a:ext uri="{C183D7F6-B498-43B3-948B-1728B52AA6E4}">
-                <adec:decorative xmlns:adec="http://schemas.microsoft.com/office/drawing/2017/decorative" val="1"/>
+                <adec:decorative xmlns:adec="http://schemas.microsoft.com/office/drawing/2017/decorative" xmlns="" val="1"/>
               </a:ext>
             </a:extLst>
           </p:cNvPr>

</xml_diff>